<commit_message>
added equations for ICE and Sparse coding
</commit_message>
<xml_diff>
--- a/Poster/Poster.pptx
+++ b/Poster/Poster.pptx
@@ -3186,7 +3186,7 @@
         </p:nvSpPr>
         <p:spPr>
           <a:xfrm>
-            <a:off x="15824198" y="30013795"/>
+            <a:off x="15791177" y="18016354"/>
             <a:ext cx="27711402" cy="2800767"/>
           </a:xfrm>
           <a:prstGeom prst="rect">
@@ -3313,7 +3313,7 @@
         <p:spPr>
           <a:xfrm>
             <a:off x="15824199" y="3494689"/>
-            <a:ext cx="27711401" cy="17081599"/>
+            <a:ext cx="27711401" cy="14126944"/>
           </a:xfrm>
           <a:prstGeom prst="rect">
             <a:avLst/>
@@ -3467,344 +3467,7 @@
           <a:p>
             <a:r>
               <a:rPr lang="en-US" sz="4800" dirty="0"/>
-              <a:t>TEXT HERE</a:t>
-            </a:r>
-          </a:p>
-          <a:p>
-            <a:r>
-              <a:rPr lang="en-US" sz="4800" dirty="0"/>
-              <a:t>TEXT HERE</a:t>
-            </a:r>
-          </a:p>
-          <a:p>
-            <a:r>
-              <a:rPr lang="en-US" sz="4800" dirty="0"/>
-              <a:t>TEXT HERE</a:t>
-            </a:r>
-          </a:p>
-          <a:p>
-            <a:r>
-              <a:rPr lang="en-US" sz="4800" dirty="0"/>
-              <a:t>TEXT HERE</a:t>
-            </a:r>
-          </a:p>
-          <a:p>
-            <a:r>
-              <a:rPr lang="en-US" sz="4800" dirty="0"/>
-              <a:t>TEXT HERE</a:t>
-            </a:r>
-          </a:p>
-        </p:txBody>
-      </p:sp>
-      <p:sp>
-        <p:nvSpPr>
-          <p:cNvPr id="15" name="TextBox 14"/>
-          <p:cNvSpPr txBox="1"/>
-          <p:nvPr/>
-        </p:nvSpPr>
-        <p:spPr>
-          <a:xfrm>
-            <a:off x="31496000" y="20318833"/>
-            <a:ext cx="12039600" cy="9694962"/>
-          </a:xfrm>
-          <a:prstGeom prst="rect">
-            <a:avLst/>
-          </a:prstGeom>
-        </p:spPr>
-        <p:style>
-          <a:lnRef idx="2">
-            <a:schemeClr val="dk1"/>
-          </a:lnRef>
-          <a:fillRef idx="1">
-            <a:schemeClr val="lt1"/>
-          </a:fillRef>
-          <a:effectRef idx="0">
-            <a:schemeClr val="dk1"/>
-          </a:effectRef>
-          <a:fontRef idx="minor">
-            <a:schemeClr val="dk1"/>
-          </a:fontRef>
-        </p:style>
-        <p:txBody>
-          <a:bodyPr wrap="square" rtlCol="0">
-            <a:spAutoFit/>
-          </a:bodyPr>
-          <a:lstStyle/>
-          <a:p>
-            <a:pPr algn="ctr"/>
-            <a:r>
-              <a:rPr lang="en-US" sz="4800" dirty="0"/>
-              <a:t>DISCUSSION/CONCLUSIONS</a:t>
-            </a:r>
-          </a:p>
-          <a:p>
-            <a:r>
-              <a:rPr lang="en-US" sz="4800" dirty="0"/>
-              <a:t>TEXT HERE</a:t>
-            </a:r>
-          </a:p>
-          <a:p>
-            <a:r>
-              <a:rPr lang="en-US" sz="4800" dirty="0"/>
-              <a:t>TEXT HERE</a:t>
-            </a:r>
-          </a:p>
-          <a:p>
-            <a:r>
-              <a:rPr lang="en-US" sz="4800" dirty="0"/>
-              <a:t>TEXT HERE</a:t>
-            </a:r>
-          </a:p>
-          <a:p>
-            <a:r>
-              <a:rPr lang="en-US" sz="4800" dirty="0"/>
-              <a:t>TEXT HERE</a:t>
-            </a:r>
-          </a:p>
-          <a:p>
-            <a:r>
-              <a:rPr lang="en-US" sz="4800" dirty="0"/>
-              <a:t>TEXT HERE</a:t>
-            </a:r>
-          </a:p>
-          <a:p>
-            <a:r>
-              <a:rPr lang="en-US" sz="4800" dirty="0"/>
-              <a:t>TEXT HERE</a:t>
-            </a:r>
-          </a:p>
-          <a:p>
-            <a:r>
-              <a:rPr lang="en-US" sz="4800" dirty="0"/>
-              <a:t>TEXT HERE</a:t>
-            </a:r>
-          </a:p>
-          <a:p>
-            <a:r>
-              <a:rPr lang="en-US" sz="4800" dirty="0"/>
-              <a:t>TEXT HERE</a:t>
-            </a:r>
-          </a:p>
-          <a:p>
-            <a:r>
-              <a:rPr lang="en-US" sz="4800" dirty="0"/>
-              <a:t>TEXT HERE</a:t>
-            </a:r>
-          </a:p>
-          <a:p>
-            <a:r>
-              <a:rPr lang="en-US" sz="4800" dirty="0"/>
-              <a:t>TEXT HERE</a:t>
-            </a:r>
-          </a:p>
-          <a:p>
-            <a:r>
-              <a:rPr lang="en-US" sz="4800" dirty="0"/>
-              <a:t>TEXT HERE</a:t>
-            </a:r>
-          </a:p>
-          <a:p>
-            <a:r>
-              <a:rPr lang="en-US" sz="4800" dirty="0"/>
-              <a:t>TEXT HERE</a:t>
-            </a:r>
-          </a:p>
-        </p:txBody>
-      </p:sp>
-      <p:sp>
-        <p:nvSpPr>
-          <p:cNvPr id="16" name="TextBox 15"/>
-          <p:cNvSpPr txBox="1"/>
-          <p:nvPr/>
-        </p:nvSpPr>
-        <p:spPr>
-          <a:xfrm>
-            <a:off x="457200" y="22321623"/>
-            <a:ext cx="14904720" cy="6001643"/>
-          </a:xfrm>
-          <a:prstGeom prst="rect">
-            <a:avLst/>
-          </a:prstGeom>
-        </p:spPr>
-        <p:style>
-          <a:lnRef idx="2">
-            <a:schemeClr val="dk1"/>
-          </a:lnRef>
-          <a:fillRef idx="1">
-            <a:schemeClr val="lt1"/>
-          </a:fillRef>
-          <a:effectRef idx="0">
-            <a:schemeClr val="dk1"/>
-          </a:effectRef>
-          <a:fontRef idx="minor">
-            <a:schemeClr val="dk1"/>
-          </a:fontRef>
-        </p:style>
-        <p:txBody>
-          <a:bodyPr wrap="square" rtlCol="0">
-            <a:spAutoFit/>
-          </a:bodyPr>
-          <a:lstStyle/>
-          <a:p>
-            <a:pPr algn="ctr"/>
-            <a:r>
-              <a:rPr lang="en-US" sz="4800" dirty="0"/>
-              <a:t>SPARSE CODING</a:t>
-            </a:r>
-          </a:p>
-          <a:p>
-            <a:pPr algn="ctr"/>
-            <a:endParaRPr lang="en-US" sz="4800" dirty="0"/>
-          </a:p>
-          <a:p>
-            <a:r>
-              <a:rPr lang="en-US" sz="4800" dirty="0"/>
-              <a:t>TEXT HERE</a:t>
-            </a:r>
-          </a:p>
-          <a:p>
-            <a:r>
-              <a:rPr lang="en-US" sz="4800" dirty="0"/>
-              <a:t>TEXT HERE</a:t>
-            </a:r>
-          </a:p>
-          <a:p>
-            <a:r>
-              <a:rPr lang="en-US" sz="4800" dirty="0"/>
-              <a:t>TEXT HERE</a:t>
-            </a:r>
-          </a:p>
-          <a:p>
-            <a:r>
-              <a:rPr lang="en-US" sz="4800" dirty="0"/>
-              <a:t>TEXT HERE</a:t>
-            </a:r>
-          </a:p>
-          <a:p>
-            <a:r>
-              <a:rPr lang="en-US" sz="4800" dirty="0"/>
-              <a:t>TEXT HERE</a:t>
-            </a:r>
-          </a:p>
-          <a:p>
-            <a:r>
-              <a:rPr lang="en-US" sz="4800" dirty="0"/>
-              <a:t>TEXT HERE</a:t>
-            </a:r>
-          </a:p>
-        </p:txBody>
-      </p:sp>
-      <p:sp>
-        <p:nvSpPr>
-          <p:cNvPr id="17" name="TextBox 16"/>
-          <p:cNvSpPr txBox="1"/>
-          <p:nvPr/>
-        </p:nvSpPr>
-        <p:spPr>
-          <a:xfrm>
-            <a:off x="15824198" y="20299499"/>
-            <a:ext cx="15367001" cy="9694962"/>
-          </a:xfrm>
-          <a:prstGeom prst="rect">
-            <a:avLst/>
-          </a:prstGeom>
-        </p:spPr>
-        <p:style>
-          <a:lnRef idx="2">
-            <a:schemeClr val="dk1"/>
-          </a:lnRef>
-          <a:fillRef idx="1">
-            <a:schemeClr val="lt1"/>
-          </a:fillRef>
-          <a:effectRef idx="0">
-            <a:schemeClr val="dk1"/>
-          </a:effectRef>
-          <a:fontRef idx="minor">
-            <a:schemeClr val="dk1"/>
-          </a:fontRef>
-        </p:style>
-        <p:txBody>
-          <a:bodyPr wrap="square" rtlCol="0">
-            <a:spAutoFit/>
-          </a:bodyPr>
-          <a:lstStyle/>
-          <a:p>
-            <a:pPr algn="ctr"/>
-            <a:r>
-              <a:rPr lang="en-US" sz="4800" dirty="0"/>
-              <a:t>MORE RESULTS/TABLES</a:t>
-            </a:r>
-          </a:p>
-          <a:p>
-            <a:r>
-              <a:rPr lang="en-US" sz="4800" dirty="0"/>
-              <a:t>TEXT HERE</a:t>
-            </a:r>
-          </a:p>
-          <a:p>
-            <a:r>
-              <a:rPr lang="en-US" sz="4800" dirty="0"/>
-              <a:t>TEXT HERE</a:t>
-            </a:r>
-          </a:p>
-          <a:p>
-            <a:r>
-              <a:rPr lang="en-US" sz="4800" dirty="0"/>
-              <a:t>TEXT HERE</a:t>
-            </a:r>
-          </a:p>
-          <a:p>
-            <a:r>
-              <a:rPr lang="en-US" sz="4800" dirty="0"/>
-              <a:t>TEXT HERE</a:t>
-            </a:r>
-          </a:p>
-          <a:p>
-            <a:r>
-              <a:rPr lang="en-US" sz="4800" dirty="0"/>
-              <a:t>TEXT HERE</a:t>
-            </a:r>
-          </a:p>
-          <a:p>
-            <a:r>
-              <a:rPr lang="en-US" sz="4800" dirty="0"/>
-              <a:t>TEXT HERE</a:t>
-            </a:r>
-          </a:p>
-          <a:p>
-            <a:r>
-              <a:rPr lang="en-US" sz="4800" dirty="0"/>
-              <a:t>TEXT HERE</a:t>
-            </a:r>
-          </a:p>
-          <a:p>
-            <a:r>
-              <a:rPr lang="en-US" sz="4800" dirty="0"/>
-              <a:t>TEXT HERE</a:t>
-            </a:r>
-          </a:p>
-          <a:p>
-            <a:r>
-              <a:rPr lang="en-US" sz="4800" dirty="0"/>
-              <a:t>TEXT HERE</a:t>
-            </a:r>
-          </a:p>
-          <a:p>
-            <a:r>
-              <a:rPr lang="en-US" sz="4800" dirty="0"/>
-              <a:t>TEXT HERE</a:t>
-            </a:r>
-          </a:p>
-          <a:p>
-            <a:r>
-              <a:rPr lang="en-US" sz="4800" dirty="0"/>
-              <a:t>TEXT HERE</a:t>
-            </a:r>
-          </a:p>
-          <a:p>
-            <a:r>
-              <a:rPr lang="en-US" sz="4800" dirty="0"/>
-              <a:t>TEXT HERE</a:t>
+              <a:t>TEXT HER</a:t>
             </a:r>
           </a:p>
         </p:txBody>
@@ -3891,6 +3554,76 @@
           <a:xfrm>
             <a:off x="546572" y="11354948"/>
             <a:ext cx="14972825" cy="10458605"/>
+          </a:xfrm>
+          <a:prstGeom prst="rect">
+            <a:avLst/>
+          </a:prstGeom>
+          <a:ln w="12700">
+            <a:solidFill>
+              <a:schemeClr val="tx1"/>
+            </a:solidFill>
+          </a:ln>
+        </p:spPr>
+      </p:pic>
+      <p:pic>
+        <p:nvPicPr>
+          <p:cNvPr id="24" name="Picture 23"/>
+          <p:cNvPicPr>
+            <a:picLocks noChangeAspect="1"/>
+          </p:cNvPicPr>
+          <p:nvPr/>
+        </p:nvPicPr>
+        <p:blipFill>
+          <a:blip r:embed="rId5">
+            <a:extLst>
+              <a:ext uri="{28A0092B-C50C-407E-A947-70E740481C1C}">
+                <a14:useLocalDpi xmlns:a14="http://schemas.microsoft.com/office/drawing/2010/main" val="0"/>
+              </a:ext>
+            </a:extLst>
+          </a:blip>
+          <a:stretch>
+            <a:fillRect/>
+          </a:stretch>
+        </p:blipFill>
+        <p:spPr>
+          <a:xfrm>
+            <a:off x="546572" y="22095516"/>
+            <a:ext cx="9969028" cy="10376787"/>
+          </a:xfrm>
+          <a:prstGeom prst="rect">
+            <a:avLst/>
+          </a:prstGeom>
+          <a:ln w="12700">
+            <a:solidFill>
+              <a:schemeClr val="tx1"/>
+            </a:solidFill>
+          </a:ln>
+        </p:spPr>
+      </p:pic>
+      <p:pic>
+        <p:nvPicPr>
+          <p:cNvPr id="29" name="Picture 28"/>
+          <p:cNvPicPr>
+            <a:picLocks noChangeAspect="1"/>
+          </p:cNvPicPr>
+          <p:nvPr/>
+        </p:nvPicPr>
+        <p:blipFill>
+          <a:blip r:embed="rId6">
+            <a:extLst>
+              <a:ext uri="{28A0092B-C50C-407E-A947-70E740481C1C}">
+                <a14:useLocalDpi xmlns:a14="http://schemas.microsoft.com/office/drawing/2010/main" val="0"/>
+              </a:ext>
+            </a:extLst>
+          </a:blip>
+          <a:stretch>
+            <a:fillRect/>
+          </a:stretch>
+        </p:blipFill>
+        <p:spPr>
+          <a:xfrm>
+            <a:off x="10924539" y="22095516"/>
+            <a:ext cx="19882551" cy="10331067"/>
           </a:xfrm>
           <a:prstGeom prst="rect">
             <a:avLst/>

</xml_diff>

<commit_message>
added spearman figure, modified SCWS evaluation script for Glove
</commit_message>
<xml_diff>
--- a/Poster/Poster.pptx
+++ b/Poster/Poster.pptx
@@ -3186,8 +3186,8 @@
         </p:nvSpPr>
         <p:spPr>
           <a:xfrm>
-            <a:off x="15791177" y="18016354"/>
-            <a:ext cx="27711402" cy="2800767"/>
+            <a:off x="546572" y="30350496"/>
+            <a:ext cx="42989028" cy="1815882"/>
           </a:xfrm>
           <a:prstGeom prst="rect">
             <a:avLst/>
@@ -3300,174 +3300,6 @@
             <a:r>
               <a:rPr lang="en-US" sz="3200" dirty="0"/>
               <a:t> preprint arXiv:1601.03764,2016.</a:t>
-            </a:r>
-          </a:p>
-        </p:txBody>
-      </p:sp>
-      <p:sp>
-        <p:nvSpPr>
-          <p:cNvPr id="14" name="TextBox 13"/>
-          <p:cNvSpPr txBox="1"/>
-          <p:nvPr/>
-        </p:nvSpPr>
-        <p:spPr>
-          <a:xfrm>
-            <a:off x="15824199" y="3494689"/>
-            <a:ext cx="27711401" cy="14126944"/>
-          </a:xfrm>
-          <a:prstGeom prst="rect">
-            <a:avLst/>
-          </a:prstGeom>
-        </p:spPr>
-        <p:style>
-          <a:lnRef idx="2">
-            <a:schemeClr val="dk1"/>
-          </a:lnRef>
-          <a:fillRef idx="1">
-            <a:schemeClr val="lt1"/>
-          </a:fillRef>
-          <a:effectRef idx="0">
-            <a:schemeClr val="dk1"/>
-          </a:effectRef>
-          <a:fontRef idx="minor">
-            <a:schemeClr val="dk1"/>
-          </a:fontRef>
-        </p:style>
-        <p:txBody>
-          <a:bodyPr wrap="square" rtlCol="0">
-            <a:spAutoFit/>
-          </a:bodyPr>
-          <a:lstStyle/>
-          <a:p>
-            <a:pPr algn="ctr"/>
-            <a:r>
-              <a:rPr lang="en-US" sz="4800" dirty="0"/>
-              <a:t>MAIN RESULTS/TABLES</a:t>
-            </a:r>
-          </a:p>
-          <a:p>
-            <a:pPr algn="ctr"/>
-            <a:r>
-              <a:rPr lang="en-US" sz="4800" dirty="0"/>
-              <a:t>Describe results of 4 </a:t>
-            </a:r>
-            <a:r>
-              <a:rPr lang="en-US" sz="4800" dirty="0" err="1"/>
-              <a:t>algos</a:t>
-            </a:r>
-            <a:r>
-              <a:rPr lang="en-US" sz="4800" dirty="0"/>
-              <a:t> (</a:t>
-            </a:r>
-            <a:r>
-              <a:rPr lang="en-US" sz="4800" dirty="0" err="1"/>
-              <a:t>GLoVe</a:t>
-            </a:r>
-            <a:r>
-              <a:rPr lang="en-US" sz="4800" dirty="0"/>
-              <a:t>, Arora, ICE)</a:t>
-            </a:r>
-          </a:p>
-          <a:p>
-            <a:r>
-              <a:rPr lang="en-US" sz="4800" dirty="0"/>
-              <a:t>TEXT HERE</a:t>
-            </a:r>
-          </a:p>
-          <a:p>
-            <a:r>
-              <a:rPr lang="en-US" sz="4800" dirty="0"/>
-              <a:t>TEXT HERE</a:t>
-            </a:r>
-          </a:p>
-          <a:p>
-            <a:r>
-              <a:rPr lang="en-US" sz="4800" dirty="0"/>
-              <a:t>TEXT HERE</a:t>
-            </a:r>
-          </a:p>
-          <a:p>
-            <a:r>
-              <a:rPr lang="en-US" sz="4800" dirty="0"/>
-              <a:t>TEXT HERE</a:t>
-            </a:r>
-          </a:p>
-          <a:p>
-            <a:r>
-              <a:rPr lang="en-US" sz="4800" dirty="0"/>
-              <a:t>TEXT HERE</a:t>
-            </a:r>
-          </a:p>
-          <a:p>
-            <a:r>
-              <a:rPr lang="en-US" sz="4800" dirty="0"/>
-              <a:t>TEXT HERE</a:t>
-            </a:r>
-          </a:p>
-          <a:p>
-            <a:r>
-              <a:rPr lang="en-US" sz="4800" dirty="0"/>
-              <a:t>TEXT HERE</a:t>
-            </a:r>
-          </a:p>
-          <a:p>
-            <a:r>
-              <a:rPr lang="en-US" sz="4800" dirty="0"/>
-              <a:t>TEXT HERE</a:t>
-            </a:r>
-          </a:p>
-          <a:p>
-            <a:r>
-              <a:rPr lang="en-US" sz="4800" dirty="0"/>
-              <a:t>TEXT HERE</a:t>
-            </a:r>
-          </a:p>
-          <a:p>
-            <a:r>
-              <a:rPr lang="en-US" sz="4800" dirty="0"/>
-              <a:t>TEXT HERE</a:t>
-            </a:r>
-          </a:p>
-          <a:p>
-            <a:r>
-              <a:rPr lang="en-US" sz="4800" dirty="0"/>
-              <a:t>TEXT HERE</a:t>
-            </a:r>
-          </a:p>
-          <a:p>
-            <a:r>
-              <a:rPr lang="en-US" sz="4800" dirty="0"/>
-              <a:t>TEXT HERE</a:t>
-            </a:r>
-          </a:p>
-          <a:p>
-            <a:r>
-              <a:rPr lang="en-US" sz="4800" dirty="0"/>
-              <a:t>TEXT HERE</a:t>
-            </a:r>
-          </a:p>
-          <a:p>
-            <a:r>
-              <a:rPr lang="en-US" sz="4800" dirty="0"/>
-              <a:t>TEXT HERE</a:t>
-            </a:r>
-          </a:p>
-          <a:p>
-            <a:r>
-              <a:rPr lang="en-US" sz="4800" dirty="0"/>
-              <a:t>TEXT HERE</a:t>
-            </a:r>
-          </a:p>
-          <a:p>
-            <a:r>
-              <a:rPr lang="en-US" sz="4800" dirty="0"/>
-              <a:t>TEXT HERE</a:t>
-            </a:r>
-          </a:p>
-          <a:p>
-            <a:r>
-              <a:rPr lang="en-US" sz="4800" dirty="0"/>
-              <a:t>TEXT HER</a:t>
             </a:r>
           </a:p>
         </p:txBody>
@@ -3588,7 +3420,7 @@
         <p:spPr>
           <a:xfrm>
             <a:off x="546572" y="22095516"/>
-            <a:ext cx="9969028" cy="10376787"/>
+            <a:ext cx="7659715" cy="7973017"/>
           </a:xfrm>
           <a:prstGeom prst="rect">
             <a:avLst/>
@@ -3622,8 +3454,8 @@
         </p:blipFill>
         <p:spPr>
           <a:xfrm>
-            <a:off x="10924539" y="22095516"/>
-            <a:ext cx="19882551" cy="10331067"/>
+            <a:off x="8455659" y="22095516"/>
+            <a:ext cx="15344391" cy="7973017"/>
           </a:xfrm>
           <a:prstGeom prst="rect">
             <a:avLst/>
@@ -3633,6 +3465,168 @@
               <a:schemeClr val="tx1"/>
             </a:solidFill>
           </a:ln>
+        </p:spPr>
+      </p:pic>
+      <p:grpSp>
+        <p:nvGrpSpPr>
+          <p:cNvPr id="7" name="Group 6"/>
+          <p:cNvGrpSpPr/>
+          <p:nvPr/>
+        </p:nvGrpSpPr>
+        <p:grpSpPr>
+          <a:xfrm>
+            <a:off x="16127853" y="13328169"/>
+            <a:ext cx="11148121" cy="6512162"/>
+            <a:chOff x="25933549" y="20031879"/>
+            <a:chExt cx="11148121" cy="6512162"/>
+          </a:xfrm>
+        </p:grpSpPr>
+        <p:pic>
+          <p:nvPicPr>
+            <p:cNvPr id="3" name="Picture 2"/>
+            <p:cNvPicPr>
+              <a:picLocks noChangeAspect="1"/>
+            </p:cNvPicPr>
+            <p:nvPr/>
+          </p:nvPicPr>
+          <p:blipFill>
+            <a:blip r:embed="rId7">
+              <a:extLst>
+                <a:ext uri="{28A0092B-C50C-407E-A947-70E740481C1C}">
+                  <a14:useLocalDpi xmlns:a14="http://schemas.microsoft.com/office/drawing/2010/main" val="0"/>
+                </a:ext>
+              </a:extLst>
+            </a:blip>
+            <a:stretch>
+              <a:fillRect/>
+            </a:stretch>
+          </p:blipFill>
+          <p:spPr>
+            <a:xfrm>
+              <a:off x="26364079" y="20745002"/>
+              <a:ext cx="10570927" cy="5377544"/>
+            </a:xfrm>
+            <a:prstGeom prst="rect">
+              <a:avLst/>
+            </a:prstGeom>
+          </p:spPr>
+        </p:pic>
+        <p:sp>
+          <p:nvSpPr>
+            <p:cNvPr id="5" name="Rectangle 4"/>
+            <p:cNvSpPr/>
+            <p:nvPr/>
+          </p:nvSpPr>
+          <p:spPr>
+            <a:xfrm>
+              <a:off x="26217414" y="20031879"/>
+              <a:ext cx="10864256" cy="523220"/>
+            </a:xfrm>
+            <a:prstGeom prst="rect">
+              <a:avLst/>
+            </a:prstGeom>
+          </p:spPr>
+          <p:txBody>
+            <a:bodyPr wrap="none">
+              <a:spAutoFit/>
+            </a:bodyPr>
+            <a:lstStyle/>
+            <a:p>
+              <a:r>
+                <a:rPr lang="en-US" sz="2800" dirty="0"/>
+                <a:t>Comparison of SCWS Word Similarities with Sense2vec Cosine Similarities</a:t>
+              </a:r>
+              <a:endParaRPr lang="en-US" sz="4000" dirty="0"/>
+            </a:p>
+          </p:txBody>
+        </p:sp>
+        <p:sp>
+          <p:nvSpPr>
+            <p:cNvPr id="16" name="Rectangle 15"/>
+            <p:cNvSpPr/>
+            <p:nvPr/>
+          </p:nvSpPr>
+          <p:spPr>
+            <a:xfrm rot="16200000">
+              <a:off x="23905494" y="22796541"/>
+              <a:ext cx="4517775" cy="461665"/>
+            </a:xfrm>
+            <a:prstGeom prst="rect">
+              <a:avLst/>
+            </a:prstGeom>
+          </p:spPr>
+          <p:txBody>
+            <a:bodyPr wrap="none">
+              <a:spAutoFit/>
+            </a:bodyPr>
+            <a:lstStyle/>
+            <a:p>
+              <a:r>
+                <a:rPr lang="en-US" sz="2400" dirty="0"/>
+                <a:t>Cosine similarities using sense2vec</a:t>
+              </a:r>
+              <a:endParaRPr lang="en-US" sz="3600" dirty="0"/>
+            </a:p>
+          </p:txBody>
+        </p:sp>
+        <p:sp>
+          <p:nvSpPr>
+            <p:cNvPr id="17" name="Rectangle 16"/>
+            <p:cNvSpPr/>
+            <p:nvPr/>
+          </p:nvSpPr>
+          <p:spPr>
+            <a:xfrm>
+              <a:off x="29820740" y="26082376"/>
+              <a:ext cx="3657604" cy="461665"/>
+            </a:xfrm>
+            <a:prstGeom prst="rect">
+              <a:avLst/>
+            </a:prstGeom>
+          </p:spPr>
+          <p:txBody>
+            <a:bodyPr wrap="none">
+              <a:spAutoFit/>
+            </a:bodyPr>
+            <a:lstStyle/>
+            <a:p>
+              <a:r>
+                <a:rPr lang="en-US" sz="2400" dirty="0"/>
+                <a:t>SCWS User Reported Scores</a:t>
+              </a:r>
+              <a:endParaRPr lang="en-US" sz="3600" dirty="0"/>
+            </a:p>
+          </p:txBody>
+        </p:sp>
+      </p:grpSp>
+      <p:pic>
+        <p:nvPicPr>
+          <p:cNvPr id="8" name="Picture 7"/>
+          <p:cNvPicPr>
+            <a:picLocks noChangeAspect="1"/>
+          </p:cNvPicPr>
+          <p:nvPr/>
+        </p:nvPicPr>
+        <p:blipFill>
+          <a:blip r:embed="rId8">
+            <a:extLst>
+              <a:ext uri="{28A0092B-C50C-407E-A947-70E740481C1C}">
+                <a14:useLocalDpi xmlns:a14="http://schemas.microsoft.com/office/drawing/2010/main" val="0"/>
+              </a:ext>
+            </a:extLst>
+          </a:blip>
+          <a:stretch>
+            <a:fillRect/>
+          </a:stretch>
+        </p:blipFill>
+        <p:spPr>
+          <a:xfrm>
+            <a:off x="16127853" y="3668698"/>
+            <a:ext cx="11957289" cy="7154877"/>
+          </a:xfrm>
+          <a:prstGeom prst="rect">
+            <a:avLst/>
+          </a:prstGeom>
         </p:spPr>
       </p:pic>
     </p:spTree>

</xml_diff>

<commit_message>
Added correlation figure for GloVe Embedding evaluation on SCWS
</commit_message>
<xml_diff>
--- a/Poster/Poster.pptx
+++ b/Poster/Poster.pptx
@@ -243,7 +243,7 @@
           <a:p>
             <a:fld id="{20B76EFC-CAEE-4F74-AEE7-09B606295E47}" type="datetimeFigureOut">
               <a:rPr lang="en-US" smtClean="0"/>
-              <a:t>11/30/2016</a:t>
+              <a:t>12/1/2016</a:t>
             </a:fld>
             <a:endParaRPr lang="en-US"/>
           </a:p>
@@ -413,7 +413,7 @@
           <a:p>
             <a:fld id="{20B76EFC-CAEE-4F74-AEE7-09B606295E47}" type="datetimeFigureOut">
               <a:rPr lang="en-US" smtClean="0"/>
-              <a:t>11/30/2016</a:t>
+              <a:t>12/1/2016</a:t>
             </a:fld>
             <a:endParaRPr lang="en-US"/>
           </a:p>
@@ -593,7 +593,7 @@
           <a:p>
             <a:fld id="{20B76EFC-CAEE-4F74-AEE7-09B606295E47}" type="datetimeFigureOut">
               <a:rPr lang="en-US" smtClean="0"/>
-              <a:t>11/30/2016</a:t>
+              <a:t>12/1/2016</a:t>
             </a:fld>
             <a:endParaRPr lang="en-US"/>
           </a:p>
@@ -763,7 +763,7 @@
           <a:p>
             <a:fld id="{20B76EFC-CAEE-4F74-AEE7-09B606295E47}" type="datetimeFigureOut">
               <a:rPr lang="en-US" smtClean="0"/>
-              <a:t>11/30/2016</a:t>
+              <a:t>12/1/2016</a:t>
             </a:fld>
             <a:endParaRPr lang="en-US"/>
           </a:p>
@@ -1007,7 +1007,7 @@
           <a:p>
             <a:fld id="{20B76EFC-CAEE-4F74-AEE7-09B606295E47}" type="datetimeFigureOut">
               <a:rPr lang="en-US" smtClean="0"/>
-              <a:t>11/30/2016</a:t>
+              <a:t>12/1/2016</a:t>
             </a:fld>
             <a:endParaRPr lang="en-US"/>
           </a:p>
@@ -1239,7 +1239,7 @@
           <a:p>
             <a:fld id="{20B76EFC-CAEE-4F74-AEE7-09B606295E47}" type="datetimeFigureOut">
               <a:rPr lang="en-US" smtClean="0"/>
-              <a:t>11/30/2016</a:t>
+              <a:t>12/1/2016</a:t>
             </a:fld>
             <a:endParaRPr lang="en-US"/>
           </a:p>
@@ -1606,7 +1606,7 @@
           <a:p>
             <a:fld id="{20B76EFC-CAEE-4F74-AEE7-09B606295E47}" type="datetimeFigureOut">
               <a:rPr lang="en-US" smtClean="0"/>
-              <a:t>11/30/2016</a:t>
+              <a:t>12/1/2016</a:t>
             </a:fld>
             <a:endParaRPr lang="en-US"/>
           </a:p>
@@ -1724,7 +1724,7 @@
           <a:p>
             <a:fld id="{20B76EFC-CAEE-4F74-AEE7-09B606295E47}" type="datetimeFigureOut">
               <a:rPr lang="en-US" smtClean="0"/>
-              <a:t>11/30/2016</a:t>
+              <a:t>12/1/2016</a:t>
             </a:fld>
             <a:endParaRPr lang="en-US"/>
           </a:p>
@@ -1819,7 +1819,7 @@
           <a:p>
             <a:fld id="{20B76EFC-CAEE-4F74-AEE7-09B606295E47}" type="datetimeFigureOut">
               <a:rPr lang="en-US" smtClean="0"/>
-              <a:t>11/30/2016</a:t>
+              <a:t>12/1/2016</a:t>
             </a:fld>
             <a:endParaRPr lang="en-US"/>
           </a:p>
@@ -2096,7 +2096,7 @@
           <a:p>
             <a:fld id="{20B76EFC-CAEE-4F74-AEE7-09B606295E47}" type="datetimeFigureOut">
               <a:rPr lang="en-US" smtClean="0"/>
-              <a:t>11/30/2016</a:t>
+              <a:t>12/1/2016</a:t>
             </a:fld>
             <a:endParaRPr lang="en-US"/>
           </a:p>
@@ -2353,7 +2353,7 @@
           <a:p>
             <a:fld id="{20B76EFC-CAEE-4F74-AEE7-09B606295E47}" type="datetimeFigureOut">
               <a:rPr lang="en-US" smtClean="0"/>
-              <a:t>11/30/2016</a:t>
+              <a:t>12/1/2016</a:t>
             </a:fld>
             <a:endParaRPr lang="en-US"/>
           </a:p>
@@ -2566,7 +2566,7 @@
           <a:p>
             <a:fld id="{20B76EFC-CAEE-4F74-AEE7-09B606295E47}" type="datetimeFigureOut">
               <a:rPr lang="en-US" smtClean="0"/>
-              <a:t>11/30/2016</a:t>
+              <a:t>12/1/2016</a:t>
             </a:fld>
             <a:endParaRPr lang="en-US"/>
           </a:p>
@@ -2973,6 +2973,45 @@
       </p:grpSpPr>
       <p:sp>
         <p:nvSpPr>
+          <p:cNvPr id="20" name="Rectangle 19"/>
+          <p:cNvSpPr/>
+          <p:nvPr/>
+        </p:nvSpPr>
+        <p:spPr>
+          <a:xfrm>
+            <a:off x="15692117" y="3470903"/>
+            <a:ext cx="27843483" cy="18342650"/>
+          </a:xfrm>
+          <a:prstGeom prst="rect">
+            <a:avLst/>
+          </a:prstGeom>
+          <a:ln w="12700"/>
+        </p:spPr>
+        <p:style>
+          <a:lnRef idx="2">
+            <a:schemeClr val="dk1"/>
+          </a:lnRef>
+          <a:fillRef idx="1">
+            <a:schemeClr val="lt1"/>
+          </a:fillRef>
+          <a:effectRef idx="0">
+            <a:schemeClr val="dk1"/>
+          </a:effectRef>
+          <a:fontRef idx="minor">
+            <a:schemeClr val="dk1"/>
+          </a:fontRef>
+        </p:style>
+        <p:txBody>
+          <a:bodyPr rtlCol="0" anchor="ctr"/>
+          <a:lstStyle/>
+          <a:p>
+            <a:pPr algn="ctr"/>
+            <a:endParaRPr lang="en-US"/>
+          </a:p>
+        </p:txBody>
+      </p:sp>
+      <p:sp>
+        <p:nvSpPr>
           <p:cNvPr id="4" name="TextBox 3"/>
           <p:cNvSpPr txBox="1"/>
           <p:nvPr/>
@@ -3105,7 +3144,7 @@
         </p:nvSpPr>
         <p:spPr>
           <a:xfrm>
-            <a:off x="546573" y="3470903"/>
+            <a:off x="546572" y="3449416"/>
             <a:ext cx="14904720" cy="7602081"/>
           </a:xfrm>
           <a:prstGeom prst="rect">
@@ -3467,141 +3506,39 @@
           </a:ln>
         </p:spPr>
       </p:pic>
-      <p:grpSp>
-        <p:nvGrpSpPr>
-          <p:cNvPr id="7" name="Group 6"/>
-          <p:cNvGrpSpPr/>
-          <p:nvPr/>
-        </p:nvGrpSpPr>
-        <p:grpSpPr>
-          <a:xfrm>
-            <a:off x="16127853" y="13328169"/>
-            <a:ext cx="11148121" cy="6512162"/>
-            <a:chOff x="25933549" y="20031879"/>
-            <a:chExt cx="11148121" cy="6512162"/>
-          </a:xfrm>
-        </p:grpSpPr>
-        <p:pic>
-          <p:nvPicPr>
-            <p:cNvPr id="3" name="Picture 2"/>
-            <p:cNvPicPr>
-              <a:picLocks noChangeAspect="1"/>
-            </p:cNvPicPr>
-            <p:nvPr/>
-          </p:nvPicPr>
-          <p:blipFill>
-            <a:blip r:embed="rId7">
-              <a:extLst>
-                <a:ext uri="{28A0092B-C50C-407E-A947-70E740481C1C}">
-                  <a14:useLocalDpi xmlns:a14="http://schemas.microsoft.com/office/drawing/2010/main" val="0"/>
-                </a:ext>
-              </a:extLst>
-            </a:blip>
-            <a:stretch>
-              <a:fillRect/>
-            </a:stretch>
-          </p:blipFill>
-          <p:spPr>
-            <a:xfrm>
-              <a:off x="26364079" y="20745002"/>
-              <a:ext cx="10570927" cy="5377544"/>
-            </a:xfrm>
-            <a:prstGeom prst="rect">
-              <a:avLst/>
-            </a:prstGeom>
-          </p:spPr>
-        </p:pic>
-        <p:sp>
-          <p:nvSpPr>
-            <p:cNvPr id="5" name="Rectangle 4"/>
-            <p:cNvSpPr/>
-            <p:nvPr/>
-          </p:nvSpPr>
-          <p:spPr>
-            <a:xfrm>
-              <a:off x="26217414" y="20031879"/>
-              <a:ext cx="10864256" cy="523220"/>
-            </a:xfrm>
-            <a:prstGeom prst="rect">
-              <a:avLst/>
-            </a:prstGeom>
-          </p:spPr>
-          <p:txBody>
-            <a:bodyPr wrap="none">
-              <a:spAutoFit/>
-            </a:bodyPr>
-            <a:lstStyle/>
-            <a:p>
-              <a:r>
-                <a:rPr lang="en-US" sz="2800" dirty="0"/>
-                <a:t>Comparison of SCWS Word Similarities with Sense2vec Cosine Similarities</a:t>
-              </a:r>
-              <a:endParaRPr lang="en-US" sz="4000" dirty="0"/>
-            </a:p>
-          </p:txBody>
-        </p:sp>
-        <p:sp>
-          <p:nvSpPr>
-            <p:cNvPr id="16" name="Rectangle 15"/>
-            <p:cNvSpPr/>
-            <p:nvPr/>
-          </p:nvSpPr>
-          <p:spPr>
-            <a:xfrm rot="16200000">
-              <a:off x="23905494" y="22796541"/>
-              <a:ext cx="4517775" cy="461665"/>
-            </a:xfrm>
-            <a:prstGeom prst="rect">
-              <a:avLst/>
-            </a:prstGeom>
-          </p:spPr>
-          <p:txBody>
-            <a:bodyPr wrap="none">
-              <a:spAutoFit/>
-            </a:bodyPr>
-            <a:lstStyle/>
-            <a:p>
-              <a:r>
-                <a:rPr lang="en-US" sz="2400" dirty="0"/>
-                <a:t>Cosine similarities using sense2vec</a:t>
-              </a:r>
-              <a:endParaRPr lang="en-US" sz="3600" dirty="0"/>
-            </a:p>
-          </p:txBody>
-        </p:sp>
-        <p:sp>
-          <p:nvSpPr>
-            <p:cNvPr id="17" name="Rectangle 16"/>
-            <p:cNvSpPr/>
-            <p:nvPr/>
-          </p:nvSpPr>
-          <p:spPr>
-            <a:xfrm>
-              <a:off x="29820740" y="26082376"/>
-              <a:ext cx="3657604" cy="461665"/>
-            </a:xfrm>
-            <a:prstGeom prst="rect">
-              <a:avLst/>
-            </a:prstGeom>
-          </p:spPr>
-          <p:txBody>
-            <a:bodyPr wrap="none">
-              <a:spAutoFit/>
-            </a:bodyPr>
-            <a:lstStyle/>
-            <a:p>
-              <a:r>
-                <a:rPr lang="en-US" sz="2400" dirty="0"/>
-                <a:t>SCWS User Reported Scores</a:t>
-              </a:r>
-              <a:endParaRPr lang="en-US" sz="3600" dirty="0"/>
-            </a:p>
-          </p:txBody>
-        </p:sp>
-      </p:grpSp>
       <p:pic>
         <p:nvPicPr>
           <p:cNvPr id="8" name="Picture 7"/>
+          <p:cNvPicPr>
+            <a:picLocks noChangeAspect="1"/>
+          </p:cNvPicPr>
+          <p:nvPr/>
+        </p:nvPicPr>
+        <p:blipFill>
+          <a:blip r:embed="rId7">
+            <a:extLst>
+              <a:ext uri="{28A0092B-C50C-407E-A947-70E740481C1C}">
+                <a14:useLocalDpi xmlns:a14="http://schemas.microsoft.com/office/drawing/2010/main" val="0"/>
+              </a:ext>
+            </a:extLst>
+          </a:blip>
+          <a:stretch>
+            <a:fillRect/>
+          </a:stretch>
+        </p:blipFill>
+        <p:spPr>
+          <a:xfrm>
+            <a:off x="30772657" y="4067345"/>
+            <a:ext cx="11957289" cy="7154877"/>
+          </a:xfrm>
+          <a:prstGeom prst="rect">
+            <a:avLst/>
+          </a:prstGeom>
+        </p:spPr>
+      </p:pic>
+      <p:pic>
+        <p:nvPicPr>
+          <p:cNvPr id="19" name="Picture 18"/>
           <p:cNvPicPr>
             <a:picLocks noChangeAspect="1"/>
           </p:cNvPicPr>
@@ -3621,8 +3558,8 @@
         </p:blipFill>
         <p:spPr>
           <a:xfrm>
-            <a:off x="16127853" y="3668698"/>
-            <a:ext cx="11957289" cy="7154877"/>
+            <a:off x="30769594" y="13004374"/>
+            <a:ext cx="11960352" cy="7159752"/>
           </a:xfrm>
           <a:prstGeom prst="rect">
             <a:avLst/>

</xml_diff>

<commit_message>
added placeholders for other figures and discussion
</commit_message>
<xml_diff>
--- a/Poster/Poster.pptx
+++ b/Poster/Poster.pptx
@@ -2979,8 +2979,8 @@
         </p:nvSpPr>
         <p:spPr>
           <a:xfrm>
-            <a:off x="15692117" y="3470903"/>
-            <a:ext cx="27843483" cy="18342650"/>
+            <a:off x="15372077" y="3333743"/>
+            <a:ext cx="28107643" cy="18296930"/>
           </a:xfrm>
           <a:prstGeom prst="rect">
             <a:avLst/>
@@ -3144,7 +3144,7 @@
         </p:nvSpPr>
         <p:spPr>
           <a:xfrm>
-            <a:off x="546572" y="3449416"/>
+            <a:off x="226532" y="3333743"/>
             <a:ext cx="14904720" cy="7602081"/>
           </a:xfrm>
           <a:prstGeom prst="rect">
@@ -3225,7 +3225,7 @@
         </p:nvSpPr>
         <p:spPr>
           <a:xfrm>
-            <a:off x="546572" y="30350496"/>
+            <a:off x="226532" y="30076176"/>
             <a:ext cx="42989028" cy="1815882"/>
           </a:xfrm>
           <a:prstGeom prst="rect">
@@ -3423,7 +3423,7 @@
         </p:blipFill>
         <p:spPr>
           <a:xfrm>
-            <a:off x="546572" y="11354948"/>
+            <a:off x="226532" y="11172068"/>
             <a:ext cx="14972825" cy="10458605"/>
           </a:xfrm>
           <a:prstGeom prst="rect">
@@ -3458,7 +3458,7 @@
         </p:blipFill>
         <p:spPr>
           <a:xfrm>
-            <a:off x="546572" y="22095516"/>
+            <a:off x="226532" y="21866916"/>
             <a:ext cx="7659715" cy="7973017"/>
           </a:xfrm>
           <a:prstGeom prst="rect">
@@ -3493,7 +3493,7 @@
         </p:blipFill>
         <p:spPr>
           <a:xfrm>
-            <a:off x="8455659" y="22095516"/>
+            <a:off x="8089899" y="21866916"/>
             <a:ext cx="15344391" cy="7973017"/>
           </a:xfrm>
           <a:prstGeom prst="rect">
@@ -3528,8 +3528,8 @@
         </p:blipFill>
         <p:spPr>
           <a:xfrm>
-            <a:off x="30772657" y="4067345"/>
-            <a:ext cx="11957289" cy="7154877"/>
+            <a:off x="30550847" y="3884465"/>
+            <a:ext cx="12179100" cy="7287602"/>
           </a:xfrm>
           <a:prstGeom prst="rect">
             <a:avLst/>
@@ -3558,14 +3558,90 @@
         </p:blipFill>
         <p:spPr>
           <a:xfrm>
-            <a:off x="30769594" y="13004374"/>
-            <a:ext cx="11960352" cy="7159752"/>
+            <a:off x="30550847" y="12187627"/>
+            <a:ext cx="12179099" cy="7290699"/>
           </a:xfrm>
           <a:prstGeom prst="rect">
             <a:avLst/>
           </a:prstGeom>
         </p:spPr>
       </p:pic>
+      <p:sp>
+        <p:nvSpPr>
+          <p:cNvPr id="21" name="TextBox 20"/>
+          <p:cNvSpPr txBox="1"/>
+          <p:nvPr/>
+        </p:nvSpPr>
+        <p:spPr>
+          <a:xfrm>
+            <a:off x="18779259" y="5982723"/>
+            <a:ext cx="8364406" cy="1569660"/>
+          </a:xfrm>
+          <a:prstGeom prst="rect">
+            <a:avLst/>
+          </a:prstGeom>
+          <a:noFill/>
+        </p:spPr>
+        <p:txBody>
+          <a:bodyPr wrap="none" rtlCol="0">
+            <a:spAutoFit/>
+          </a:bodyPr>
+          <a:lstStyle/>
+          <a:p>
+            <a:r>
+              <a:rPr lang="en-US" sz="9600" dirty="0">
+                <a:solidFill>
+                  <a:srgbClr val="FF0000"/>
+                </a:solidFill>
+              </a:rPr>
+              <a:t>Add results here</a:t>
+            </a:r>
+            <a:endParaRPr lang="en-US" sz="1100" dirty="0">
+              <a:solidFill>
+                <a:srgbClr val="FF0000"/>
+              </a:solidFill>
+            </a:endParaRPr>
+          </a:p>
+        </p:txBody>
+      </p:sp>
+      <p:sp>
+        <p:nvSpPr>
+          <p:cNvPr id="25" name="TextBox 24"/>
+          <p:cNvSpPr txBox="1"/>
+          <p:nvPr/>
+        </p:nvSpPr>
+        <p:spPr>
+          <a:xfrm>
+            <a:off x="18779259" y="14519666"/>
+            <a:ext cx="8364406" cy="1569660"/>
+          </a:xfrm>
+          <a:prstGeom prst="rect">
+            <a:avLst/>
+          </a:prstGeom>
+          <a:noFill/>
+        </p:spPr>
+        <p:txBody>
+          <a:bodyPr wrap="none" rtlCol="0">
+            <a:spAutoFit/>
+          </a:bodyPr>
+          <a:lstStyle/>
+          <a:p>
+            <a:r>
+              <a:rPr lang="en-US" sz="9600" dirty="0">
+                <a:solidFill>
+                  <a:srgbClr val="FF0000"/>
+                </a:solidFill>
+              </a:rPr>
+              <a:t>Add results here</a:t>
+            </a:r>
+            <a:endParaRPr lang="en-US" sz="1100" dirty="0">
+              <a:solidFill>
+                <a:srgbClr val="FF0000"/>
+              </a:solidFill>
+            </a:endParaRPr>
+          </a:p>
+        </p:txBody>
+      </p:sp>
     </p:spTree>
     <p:extLst>
       <p:ext uri="{BB962C8B-B14F-4D97-AF65-F5344CB8AC3E}">

</xml_diff>

<commit_message>
modified notebook for evaluation on Glove
</commit_message>
<xml_diff>
--- a/Poster/Poster.pptx
+++ b/Poster/Poster.pptx
@@ -2980,7 +2980,7 @@
         <p:spPr>
           <a:xfrm>
             <a:off x="15372077" y="3333743"/>
-            <a:ext cx="28107643" cy="18296930"/>
+            <a:ext cx="28107643" cy="18937010"/>
           </a:xfrm>
           <a:prstGeom prst="rect">
             <a:avLst/>
@@ -3145,7 +3145,7 @@
         <p:spPr>
           <a:xfrm>
             <a:off x="226532" y="3333743"/>
-            <a:ext cx="14904720" cy="7602081"/>
+            <a:ext cx="14904720" cy="8217634"/>
           </a:xfrm>
           <a:prstGeom prst="rect">
             <a:avLst/>
@@ -3196,7 +3196,23 @@
             </a:r>
             <a:r>
               <a:rPr lang="en-US" sz="4000" dirty="0"/>
-              <a:t>)[1] and a sparse coding based method [2] have sought to overcome this problem. Our work focuses on first evaluating these methods and doing a comparative study followed by a proposal to develop an alternative method that learn context </a:t>
+              <a:t>)[1] and a sparse coding based method [2] have sought to overcome this problem. Our work focuses on first evaluating these methods and doing a comparative study of different </a:t>
+            </a:r>
+            <a:r>
+              <a:rPr lang="en-US" sz="4000" dirty="0" err="1"/>
+              <a:t>embeddings</a:t>
+            </a:r>
+            <a:r>
+              <a:rPr lang="en-US" sz="4000" dirty="0"/>
+              <a:t> schemes (such as </a:t>
+            </a:r>
+            <a:r>
+              <a:rPr lang="en-US" sz="4000" dirty="0" err="1"/>
+              <a:t>GloVe</a:t>
+            </a:r>
+            <a:r>
+              <a:rPr lang="en-US" sz="4000" dirty="0"/>
+              <a:t>, ICE and Sense2vec [3]) and evaluation methods followed by a proposal to develop an alternative method that learn context </a:t>
             </a:r>
             <a:r>
               <a:rPr lang="en-US" sz="4000" dirty="0" err="1"/>
@@ -3225,8 +3241,8 @@
         </p:nvSpPr>
         <p:spPr>
           <a:xfrm>
-            <a:off x="226532" y="30076176"/>
-            <a:ext cx="42989028" cy="1815882"/>
+            <a:off x="180812" y="30624816"/>
+            <a:ext cx="43298907" cy="2185214"/>
           </a:xfrm>
           <a:prstGeom prst="rect">
             <a:avLst/>
@@ -3253,7 +3269,7 @@
           <a:lstStyle/>
           <a:p>
             <a:r>
-              <a:rPr lang="en-US" sz="4800" dirty="0"/>
+              <a:rPr lang="en-US" sz="4000" dirty="0"/>
               <a:t>REFERENCES</a:t>
             </a:r>
           </a:p>
@@ -3339,6 +3355,36 @@
             <a:r>
               <a:rPr lang="en-US" sz="3200" dirty="0"/>
               <a:t> preprint arXiv:1601.03764,2016.</a:t>
+            </a:r>
+          </a:p>
+          <a:p>
+            <a:r>
+              <a:rPr lang="en-US" sz="3200" dirty="0"/>
+              <a:t>3. Andrew Trask, Phil </a:t>
+            </a:r>
+            <a:r>
+              <a:rPr lang="en-US" sz="3200" dirty="0" err="1"/>
+              <a:t>Michalak</a:t>
+            </a:r>
+            <a:r>
+              <a:rPr lang="en-US" sz="3200" dirty="0"/>
+              <a:t>, and John Liu. sense2vec-a fast and accurate method for word sense disambiguation in neural word </a:t>
+            </a:r>
+            <a:r>
+              <a:rPr lang="en-US" sz="3200" dirty="0" err="1"/>
+              <a:t>embeddings</a:t>
+            </a:r>
+            <a:r>
+              <a:rPr lang="en-US" sz="3200" dirty="0"/>
+              <a:t>. </a:t>
+            </a:r>
+            <a:r>
+              <a:rPr lang="en-US" sz="3200" dirty="0" err="1"/>
+              <a:t>arXiv</a:t>
+            </a:r>
+            <a:r>
+              <a:rPr lang="en-US" sz="3200" dirty="0"/>
+              <a:t> preprint arXiv:1511.06388, 2015.</a:t>
             </a:r>
           </a:p>
         </p:txBody>
@@ -3423,7 +3469,7 @@
         </p:blipFill>
         <p:spPr>
           <a:xfrm>
-            <a:off x="226532" y="11172068"/>
+            <a:off x="226532" y="11812148"/>
             <a:ext cx="14972825" cy="10458605"/>
           </a:xfrm>
           <a:prstGeom prst="rect">
@@ -3458,7 +3504,7 @@
         </p:blipFill>
         <p:spPr>
           <a:xfrm>
-            <a:off x="226532" y="21866916"/>
+            <a:off x="226532" y="22506996"/>
             <a:ext cx="7659715" cy="7973017"/>
           </a:xfrm>
           <a:prstGeom prst="rect">
@@ -3493,7 +3539,7 @@
         </p:blipFill>
         <p:spPr>
           <a:xfrm>
-            <a:off x="8089899" y="21866916"/>
+            <a:off x="8089899" y="22506996"/>
             <a:ext cx="15344391" cy="7973017"/>
           </a:xfrm>
           <a:prstGeom prst="rect">
@@ -3639,6 +3685,60 @@
                 <a:srgbClr val="FF0000"/>
               </a:solidFill>
             </a:endParaRPr>
+          </a:p>
+        </p:txBody>
+      </p:sp>
+      <p:sp>
+        <p:nvSpPr>
+          <p:cNvPr id="26" name="TextBox 25"/>
+          <p:cNvSpPr txBox="1"/>
+          <p:nvPr/>
+        </p:nvSpPr>
+        <p:spPr>
+          <a:xfrm>
+            <a:off x="23675114" y="22504528"/>
+            <a:ext cx="19804605" cy="1754326"/>
+          </a:xfrm>
+          <a:prstGeom prst="rect">
+            <a:avLst/>
+          </a:prstGeom>
+        </p:spPr>
+        <p:style>
+          <a:lnRef idx="2">
+            <a:schemeClr val="dk1"/>
+          </a:lnRef>
+          <a:fillRef idx="1">
+            <a:schemeClr val="lt1"/>
+          </a:fillRef>
+          <a:effectRef idx="0">
+            <a:schemeClr val="dk1"/>
+          </a:effectRef>
+          <a:fontRef idx="minor">
+            <a:schemeClr val="dk1"/>
+          </a:fontRef>
+        </p:style>
+        <p:txBody>
+          <a:bodyPr wrap="square" rtlCol="0">
+            <a:spAutoFit/>
+          </a:bodyPr>
+          <a:lstStyle/>
+          <a:p>
+            <a:pPr algn="ctr"/>
+            <a:r>
+              <a:rPr lang="en-US" sz="4800" dirty="0"/>
+              <a:t>LSTM BASED APPROACH/DISCUSSION/CONCLUSIONS</a:t>
+            </a:r>
+          </a:p>
+          <a:p>
+            <a:pPr algn="ctr"/>
+            <a:r>
+              <a:rPr lang="en-US" sz="6000" b="1" dirty="0">
+                <a:solidFill>
+                  <a:srgbClr val="FF0000"/>
+                </a:solidFill>
+              </a:rPr>
+              <a:t>Add Discussion here</a:t>
+            </a:r>
           </a:p>
         </p:txBody>
       </p:sp>

</xml_diff>

<commit_message>
added correlation line in plots
</commit_message>
<xml_diff>
--- a/Poster/Poster.pptx
+++ b/Poster/Poster.pptx
@@ -2979,7 +2979,7 @@
         </p:nvSpPr>
         <p:spPr>
           <a:xfrm>
-            <a:off x="15372077" y="3333743"/>
+            <a:off x="15199357" y="3333743"/>
             <a:ext cx="28107643" cy="18937010"/>
           </a:xfrm>
           <a:prstGeom prst="rect">
@@ -3552,66 +3552,6 @@
           </a:ln>
         </p:spPr>
       </p:pic>
-      <p:pic>
-        <p:nvPicPr>
-          <p:cNvPr id="8" name="Picture 7"/>
-          <p:cNvPicPr>
-            <a:picLocks noChangeAspect="1"/>
-          </p:cNvPicPr>
-          <p:nvPr/>
-        </p:nvPicPr>
-        <p:blipFill>
-          <a:blip r:embed="rId7">
-            <a:extLst>
-              <a:ext uri="{28A0092B-C50C-407E-A947-70E740481C1C}">
-                <a14:useLocalDpi xmlns:a14="http://schemas.microsoft.com/office/drawing/2010/main" val="0"/>
-              </a:ext>
-            </a:extLst>
-          </a:blip>
-          <a:stretch>
-            <a:fillRect/>
-          </a:stretch>
-        </p:blipFill>
-        <p:spPr>
-          <a:xfrm>
-            <a:off x="30550847" y="3884465"/>
-            <a:ext cx="12179100" cy="7287602"/>
-          </a:xfrm>
-          <a:prstGeom prst="rect">
-            <a:avLst/>
-          </a:prstGeom>
-        </p:spPr>
-      </p:pic>
-      <p:pic>
-        <p:nvPicPr>
-          <p:cNvPr id="19" name="Picture 18"/>
-          <p:cNvPicPr>
-            <a:picLocks noChangeAspect="1"/>
-          </p:cNvPicPr>
-          <p:nvPr/>
-        </p:nvPicPr>
-        <p:blipFill>
-          <a:blip r:embed="rId8">
-            <a:extLst>
-              <a:ext uri="{28A0092B-C50C-407E-A947-70E740481C1C}">
-                <a14:useLocalDpi xmlns:a14="http://schemas.microsoft.com/office/drawing/2010/main" val="0"/>
-              </a:ext>
-            </a:extLst>
-          </a:blip>
-          <a:stretch>
-            <a:fillRect/>
-          </a:stretch>
-        </p:blipFill>
-        <p:spPr>
-          <a:xfrm>
-            <a:off x="30550847" y="12187627"/>
-            <a:ext cx="12179099" cy="7290699"/>
-          </a:xfrm>
-          <a:prstGeom prst="rect">
-            <a:avLst/>
-          </a:prstGeom>
-        </p:spPr>
-      </p:pic>
       <p:sp>
         <p:nvSpPr>
           <p:cNvPr id="21" name="TextBox 20"/>
@@ -3742,6 +3682,66 @@
           </a:p>
         </p:txBody>
       </p:sp>
+      <p:pic>
+        <p:nvPicPr>
+          <p:cNvPr id="3" name="Picture 2"/>
+          <p:cNvPicPr>
+            <a:picLocks noChangeAspect="1"/>
+          </p:cNvPicPr>
+          <p:nvPr/>
+        </p:nvPicPr>
+        <p:blipFill>
+          <a:blip r:embed="rId7">
+            <a:extLst>
+              <a:ext uri="{28A0092B-C50C-407E-A947-70E740481C1C}">
+                <a14:useLocalDpi xmlns:a14="http://schemas.microsoft.com/office/drawing/2010/main" val="0"/>
+              </a:ext>
+            </a:extLst>
+          </a:blip>
+          <a:stretch>
+            <a:fillRect/>
+          </a:stretch>
+        </p:blipFill>
+        <p:spPr>
+          <a:xfrm>
+            <a:off x="31446746" y="12496800"/>
+            <a:ext cx="10529887" cy="7521348"/>
+          </a:xfrm>
+          <a:prstGeom prst="rect">
+            <a:avLst/>
+          </a:prstGeom>
+        </p:spPr>
+      </p:pic>
+      <p:pic>
+        <p:nvPicPr>
+          <p:cNvPr id="5" name="Picture 4"/>
+          <p:cNvPicPr>
+            <a:picLocks noChangeAspect="1"/>
+          </p:cNvPicPr>
+          <p:nvPr/>
+        </p:nvPicPr>
+        <p:blipFill>
+          <a:blip r:embed="rId8">
+            <a:extLst>
+              <a:ext uri="{28A0092B-C50C-407E-A947-70E740481C1C}">
+                <a14:useLocalDpi xmlns:a14="http://schemas.microsoft.com/office/drawing/2010/main" val="0"/>
+              </a:ext>
+            </a:extLst>
+          </a:blip>
+          <a:stretch>
+            <a:fillRect/>
+          </a:stretch>
+        </p:blipFill>
+        <p:spPr>
+          <a:xfrm>
+            <a:off x="31444387" y="4632658"/>
+            <a:ext cx="10532246" cy="7523033"/>
+          </a:xfrm>
+          <a:prstGeom prst="rect">
+            <a:avLst/>
+          </a:prstGeom>
+        </p:spPr>
+      </p:pic>
     </p:spTree>
     <p:extLst>
       <p:ext uri="{BB962C8B-B14F-4D97-AF65-F5344CB8AC3E}">

</xml_diff>

<commit_message>
typo in name corrected
</commit_message>
<xml_diff>
--- a/Poster/Poster.pptx
+++ b/Poster/Poster.pptx
@@ -2979,7 +2979,7 @@
         </p:nvSpPr>
         <p:spPr>
           <a:xfrm>
-            <a:off x="15199357" y="3333743"/>
+            <a:off x="15336517" y="3333743"/>
             <a:ext cx="28107643" cy="18937010"/>
           </a:xfrm>
           <a:prstGeom prst="rect">
@@ -3413,7 +3413,7 @@
           <a:p>
             <a:r>
               <a:rPr lang="en-US" sz="5400" dirty="0" err="1"/>
-              <a:t>Devandra</a:t>
+              <a:t>Devendra</a:t>
             </a:r>
             <a:r>
               <a:rPr lang="en-US" sz="5400" dirty="0"/>

</xml_diff>